<commit_message>
Add more background figures and data visualizations on ACE2 seqs and RBD ASR/phylogeny
</commit_message>
<xml_diff>
--- a/ACE2_sequences/ACE2-musings.pptx
+++ b/ACE2_sequences/ACE2-musings.pptx
@@ -5,7 +5,7 @@
     <p:sldMasterId id="2147483648" r:id="rId1"/>
   </p:sldMasterIdLst>
   <p:notesMasterIdLst>
-    <p:notesMasterId r:id="rId8"/>
+    <p:notesMasterId r:id="rId9"/>
   </p:notesMasterIdLst>
   <p:sldIdLst>
     <p:sldId id="257" r:id="rId2"/>
@@ -14,6 +14,7 @@
     <p:sldId id="258" r:id="rId5"/>
     <p:sldId id="259" r:id="rId6"/>
     <p:sldId id="260" r:id="rId7"/>
+    <p:sldId id="262" r:id="rId8"/>
   </p:sldIdLst>
   <p:sldSz cx="12192000" cy="6858000"/>
   <p:notesSz cx="6858000" cy="9144000"/>
@@ -112,6 +113,11 @@
       </a:defRPr>
     </a:lvl9pPr>
   </p:defaultTextStyle>
+  <p:extLst>
+    <p:ext uri="{EFAFB233-063F-42B5-8137-9DF3F51BA10A}">
+      <p15:sldGuideLst xmlns:p15="http://schemas.microsoft.com/office/powerpoint/2012/main"/>
+    </p:ext>
+  </p:extLst>
 </p:presentation>
 </file>
 
@@ -197,7 +203,7 @@
           <a:p>
             <a:fld id="{F9037DC4-3110-1E4D-9297-E1C154B1E4E7}" type="datetimeFigureOut">
               <a:rPr lang="en-US" smtClean="0"/>
-              <a:t>7/3/20</a:t>
+              <a:t>10/18/20</a:t>
             </a:fld>
             <a:endParaRPr lang="en-US"/>
           </a:p>
@@ -649,6 +655,119 @@
 </p:notes>
 </file>
 
+<file path=ppt/notesSlides/notesSlide3.xml><?xml version="1.0" encoding="utf-8"?>
+<p:notes xmlns:a="http://schemas.openxmlformats.org/drawingml/2006/main" xmlns:r="http://schemas.openxmlformats.org/officeDocument/2006/relationships" xmlns:p="http://schemas.openxmlformats.org/presentationml/2006/main">
+  <p:cSld>
+    <p:spTree>
+      <p:nvGrpSpPr>
+        <p:cNvPr id="1" name=""/>
+        <p:cNvGrpSpPr/>
+        <p:nvPr/>
+      </p:nvGrpSpPr>
+      <p:grpSpPr>
+        <a:xfrm>
+          <a:off x="0" y="0"/>
+          <a:ext cx="0" cy="0"/>
+          <a:chOff x="0" y="0"/>
+          <a:chExt cx="0" cy="0"/>
+        </a:xfrm>
+      </p:grpSpPr>
+      <p:sp>
+        <p:nvSpPr>
+          <p:cNvPr id="2" name="Slide Image Placeholder 1"/>
+          <p:cNvSpPr>
+            <a:spLocks noGrp="1" noRot="1" noChangeAspect="1"/>
+          </p:cNvSpPr>
+          <p:nvPr>
+            <p:ph type="sldImg"/>
+          </p:nvPr>
+        </p:nvSpPr>
+        <p:spPr/>
+      </p:sp>
+      <p:sp>
+        <p:nvSpPr>
+          <p:cNvPr id="3" name="Notes Placeholder 2"/>
+          <p:cNvSpPr>
+            <a:spLocks noGrp="1"/>
+          </p:cNvSpPr>
+          <p:nvPr>
+            <p:ph type="body" idx="1"/>
+          </p:nvPr>
+        </p:nvSpPr>
+        <p:spPr/>
+        <p:txBody>
+          <a:bodyPr/>
+          <a:lstStyle/>
+          <a:p>
+            <a:pPr marL="0" marR="0" lvl="0" indent="0" algn="l" defTabSz="914400" rtl="0" eaLnBrk="1" fontAlgn="auto" latinLnBrk="0" hangingPunct="1">
+              <a:lnSpc>
+                <a:spcPct val="100000"/>
+              </a:lnSpc>
+              <a:spcBef>
+                <a:spcPts val="0"/>
+              </a:spcBef>
+              <a:spcAft>
+                <a:spcPts val="0"/>
+              </a:spcAft>
+              <a:buClrTx/>
+              <a:buSzTx/>
+              <a:buFontTx/>
+              <a:buNone/>
+              <a:tabLst/>
+              <a:defRPr/>
+            </a:pPr>
+            <a:r>
+              <a:rPr lang="en-US" dirty="0"/>
+              <a:t>Structural contacts: </a:t>
+            </a:r>
+            <a:r>
+              <a:rPr lang="en-US" dirty="0">
+                <a:effectLst/>
+              </a:rPr>
+              <a:t>24+27+28+30+31+34+35+37+38+41+42+79+82+83+330+353+354+355+357+393</a:t>
+            </a:r>
+          </a:p>
+          <a:p>
+            <a:endParaRPr lang="en-US" dirty="0"/>
+          </a:p>
+        </p:txBody>
+      </p:sp>
+      <p:sp>
+        <p:nvSpPr>
+          <p:cNvPr id="4" name="Slide Number Placeholder 3"/>
+          <p:cNvSpPr>
+            <a:spLocks noGrp="1"/>
+          </p:cNvSpPr>
+          <p:nvPr>
+            <p:ph type="sldNum" sz="quarter" idx="5"/>
+          </p:nvPr>
+        </p:nvSpPr>
+        <p:spPr/>
+        <p:txBody>
+          <a:bodyPr/>
+          <a:lstStyle/>
+          <a:p>
+            <a:fld id="{67106A78-FA91-F240-916E-68AC922AFB11}" type="slidenum">
+              <a:rPr lang="en-US" smtClean="0"/>
+              <a:t>7</a:t>
+            </a:fld>
+            <a:endParaRPr lang="en-US"/>
+          </a:p>
+        </p:txBody>
+      </p:sp>
+    </p:spTree>
+    <p:extLst>
+      <p:ext uri="{BB962C8B-B14F-4D97-AF65-F5344CB8AC3E}">
+        <p14:creationId xmlns:p14="http://schemas.microsoft.com/office/powerpoint/2010/main" val="3176343892"/>
+      </p:ext>
+    </p:extLst>
+  </p:cSld>
+  <p:clrMapOvr>
+    <a:masterClrMapping/>
+  </p:clrMapOvr>
+</p:notes>
+</file>
+
 <file path=ppt/slideLayouts/slideLayout1.xml><?xml version="1.0" encoding="utf-8"?>
 <p:sldLayout xmlns:a="http://schemas.openxmlformats.org/drawingml/2006/main" xmlns:r="http://schemas.openxmlformats.org/officeDocument/2006/relationships" xmlns:p="http://schemas.openxmlformats.org/presentationml/2006/main" type="title" preserve="1">
   <p:cSld name="Title Slide">
@@ -796,7 +915,7 @@
           <a:p>
             <a:fld id="{C5EEB2BD-AF44-8647-826B-96E1D0372236}" type="datetimeFigureOut">
               <a:rPr lang="en-US" smtClean="0"/>
-              <a:t>7/3/20</a:t>
+              <a:t>10/18/20</a:t>
             </a:fld>
             <a:endParaRPr lang="en-US"/>
           </a:p>
@@ -994,7 +1113,7 @@
           <a:p>
             <a:fld id="{C5EEB2BD-AF44-8647-826B-96E1D0372236}" type="datetimeFigureOut">
               <a:rPr lang="en-US" smtClean="0"/>
-              <a:t>7/3/20</a:t>
+              <a:t>10/18/20</a:t>
             </a:fld>
             <a:endParaRPr lang="en-US"/>
           </a:p>
@@ -1202,7 +1321,7 @@
           <a:p>
             <a:fld id="{C5EEB2BD-AF44-8647-826B-96E1D0372236}" type="datetimeFigureOut">
               <a:rPr lang="en-US" smtClean="0"/>
-              <a:t>7/3/20</a:t>
+              <a:t>10/18/20</a:t>
             </a:fld>
             <a:endParaRPr lang="en-US"/>
           </a:p>
@@ -1400,7 +1519,7 @@
           <a:p>
             <a:fld id="{C5EEB2BD-AF44-8647-826B-96E1D0372236}" type="datetimeFigureOut">
               <a:rPr lang="en-US" smtClean="0"/>
-              <a:t>7/3/20</a:t>
+              <a:t>10/18/20</a:t>
             </a:fld>
             <a:endParaRPr lang="en-US"/>
           </a:p>
@@ -1675,7 +1794,7 @@
           <a:p>
             <a:fld id="{C5EEB2BD-AF44-8647-826B-96E1D0372236}" type="datetimeFigureOut">
               <a:rPr lang="en-US" smtClean="0"/>
-              <a:t>7/3/20</a:t>
+              <a:t>10/18/20</a:t>
             </a:fld>
             <a:endParaRPr lang="en-US"/>
           </a:p>
@@ -1940,7 +2059,7 @@
           <a:p>
             <a:fld id="{C5EEB2BD-AF44-8647-826B-96E1D0372236}" type="datetimeFigureOut">
               <a:rPr lang="en-US" smtClean="0"/>
-              <a:t>7/3/20</a:t>
+              <a:t>10/18/20</a:t>
             </a:fld>
             <a:endParaRPr lang="en-US"/>
           </a:p>
@@ -2352,7 +2471,7 @@
           <a:p>
             <a:fld id="{C5EEB2BD-AF44-8647-826B-96E1D0372236}" type="datetimeFigureOut">
               <a:rPr lang="en-US" smtClean="0"/>
-              <a:t>7/3/20</a:t>
+              <a:t>10/18/20</a:t>
             </a:fld>
             <a:endParaRPr lang="en-US"/>
           </a:p>
@@ -2493,7 +2612,7 @@
           <a:p>
             <a:fld id="{C5EEB2BD-AF44-8647-826B-96E1D0372236}" type="datetimeFigureOut">
               <a:rPr lang="en-US" smtClean="0"/>
-              <a:t>7/3/20</a:t>
+              <a:t>10/18/20</a:t>
             </a:fld>
             <a:endParaRPr lang="en-US"/>
           </a:p>
@@ -2606,7 +2725,7 @@
           <a:p>
             <a:fld id="{C5EEB2BD-AF44-8647-826B-96E1D0372236}" type="datetimeFigureOut">
               <a:rPr lang="en-US" smtClean="0"/>
-              <a:t>7/3/20</a:t>
+              <a:t>10/18/20</a:t>
             </a:fld>
             <a:endParaRPr lang="en-US"/>
           </a:p>
@@ -2917,7 +3036,7 @@
           <a:p>
             <a:fld id="{C5EEB2BD-AF44-8647-826B-96E1D0372236}" type="datetimeFigureOut">
               <a:rPr lang="en-US" smtClean="0"/>
-              <a:t>7/3/20</a:t>
+              <a:t>10/18/20</a:t>
             </a:fld>
             <a:endParaRPr lang="en-US"/>
           </a:p>
@@ -3205,7 +3324,7 @@
           <a:p>
             <a:fld id="{C5EEB2BD-AF44-8647-826B-96E1D0372236}" type="datetimeFigureOut">
               <a:rPr lang="en-US" smtClean="0"/>
-              <a:t>7/3/20</a:t>
+              <a:t>10/18/20</a:t>
             </a:fld>
             <a:endParaRPr lang="en-US"/>
           </a:p>
@@ -3446,7 +3565,7 @@
           <a:p>
             <a:fld id="{C5EEB2BD-AF44-8647-826B-96E1D0372236}" type="datetimeFigureOut">
               <a:rPr lang="en-US" smtClean="0"/>
-              <a:t>7/3/20</a:t>
+              <a:t>10/18/20</a:t>
             </a:fld>
             <a:endParaRPr lang="en-US"/>
           </a:p>
@@ -5218,6 +5337,1259 @@
     <p:extLst>
       <p:ext uri="{BB962C8B-B14F-4D97-AF65-F5344CB8AC3E}">
         <p14:creationId xmlns:p14="http://schemas.microsoft.com/office/powerpoint/2010/main" val="1617603244"/>
+      </p:ext>
+    </p:extLst>
+  </p:cSld>
+  <p:clrMapOvr>
+    <a:masterClrMapping/>
+  </p:clrMapOvr>
+</p:sld>
+</file>
+
+<file path=ppt/slides/slide7.xml><?xml version="1.0" encoding="utf-8"?>
+<p:sld xmlns:a="http://schemas.openxmlformats.org/drawingml/2006/main" xmlns:r="http://schemas.openxmlformats.org/officeDocument/2006/relationships" xmlns:p="http://schemas.openxmlformats.org/presentationml/2006/main">
+  <p:cSld>
+    <p:spTree>
+      <p:nvGrpSpPr>
+        <p:cNvPr id="1" name=""/>
+        <p:cNvGrpSpPr/>
+        <p:nvPr/>
+      </p:nvGrpSpPr>
+      <p:grpSpPr>
+        <a:xfrm>
+          <a:off x="0" y="0"/>
+          <a:ext cx="0" cy="0"/>
+          <a:chOff x="0" y="0"/>
+          <a:chExt cx="0" cy="0"/>
+        </a:xfrm>
+      </p:grpSpPr>
+      <p:pic>
+        <p:nvPicPr>
+          <p:cNvPr id="12" name="Picture 11">
+            <a:extLst>
+              <a:ext uri="{FF2B5EF4-FFF2-40B4-BE49-F238E27FC236}">
+                <a16:creationId xmlns:a16="http://schemas.microsoft.com/office/drawing/2014/main" id="{FD893EB4-FC99-6A49-BEB1-E25F1E1B2B91}"/>
+              </a:ext>
+            </a:extLst>
+          </p:cNvPr>
+          <p:cNvPicPr>
+            <a:picLocks noChangeAspect="1"/>
+          </p:cNvPicPr>
+          <p:nvPr/>
+        </p:nvPicPr>
+        <p:blipFill rotWithShape="1">
+          <a:blip r:embed="rId3"/>
+          <a:srcRect t="1" r="96563" b="22693"/>
+          <a:stretch/>
+        </p:blipFill>
+        <p:spPr>
+          <a:xfrm>
+            <a:off x="442650" y="955394"/>
+            <a:ext cx="2314415" cy="2237151"/>
+          </a:xfrm>
+          <a:prstGeom prst="rect">
+            <a:avLst/>
+          </a:prstGeom>
+        </p:spPr>
+      </p:pic>
+      <p:pic>
+        <p:nvPicPr>
+          <p:cNvPr id="14" name="Picture 13">
+            <a:extLst>
+              <a:ext uri="{FF2B5EF4-FFF2-40B4-BE49-F238E27FC236}">
+                <a16:creationId xmlns:a16="http://schemas.microsoft.com/office/drawing/2014/main" id="{4FC209AA-4A4F-6E47-90F8-FAFA8CF41341}"/>
+              </a:ext>
+            </a:extLst>
+          </p:cNvPr>
+          <p:cNvPicPr>
+            <a:picLocks noChangeAspect="1"/>
+          </p:cNvPicPr>
+          <p:nvPr/>
+        </p:nvPicPr>
+        <p:blipFill rotWithShape="1">
+          <a:blip r:embed="rId3"/>
+          <a:srcRect l="6066" t="1" r="89732" b="22693"/>
+          <a:stretch/>
+        </p:blipFill>
+        <p:spPr>
+          <a:xfrm>
+            <a:off x="2870395" y="955394"/>
+            <a:ext cx="2830317" cy="2237152"/>
+          </a:xfrm>
+          <a:prstGeom prst="rect">
+            <a:avLst/>
+          </a:prstGeom>
+        </p:spPr>
+      </p:pic>
+      <p:sp>
+        <p:nvSpPr>
+          <p:cNvPr id="15" name="TextBox 14">
+            <a:extLst>
+              <a:ext uri="{FF2B5EF4-FFF2-40B4-BE49-F238E27FC236}">
+                <a16:creationId xmlns:a16="http://schemas.microsoft.com/office/drawing/2014/main" id="{FD438519-E353-164C-B7FE-92DFAE532FA7}"/>
+              </a:ext>
+            </a:extLst>
+          </p:cNvPr>
+          <p:cNvSpPr txBox="1"/>
+          <p:nvPr/>
+        </p:nvSpPr>
+        <p:spPr>
+          <a:xfrm>
+            <a:off x="3962069" y="586062"/>
+            <a:ext cx="702436" cy="307777"/>
+          </a:xfrm>
+          <a:prstGeom prst="rect">
+            <a:avLst/>
+          </a:prstGeom>
+          <a:noFill/>
+        </p:spPr>
+        <p:txBody>
+          <a:bodyPr wrap="none" rtlCol="0">
+            <a:spAutoFit/>
+          </a:bodyPr>
+          <a:lstStyle/>
+          <a:p>
+            <a:r>
+              <a:rPr lang="en-US" sz="1400" dirty="0">
+                <a:latin typeface="Helvetica" pitchFamily="2" charset="0"/>
+              </a:rPr>
+              <a:t>helix 1</a:t>
+            </a:r>
+          </a:p>
+        </p:txBody>
+      </p:sp>
+      <p:sp>
+        <p:nvSpPr>
+          <p:cNvPr id="16" name="TextBox 15">
+            <a:extLst>
+              <a:ext uri="{FF2B5EF4-FFF2-40B4-BE49-F238E27FC236}">
+                <a16:creationId xmlns:a16="http://schemas.microsoft.com/office/drawing/2014/main" id="{1611B3BA-68C0-2B4E-A336-D998772F838A}"/>
+              </a:ext>
+            </a:extLst>
+          </p:cNvPr>
+          <p:cNvSpPr txBox="1"/>
+          <p:nvPr/>
+        </p:nvSpPr>
+        <p:spPr>
+          <a:xfrm>
+            <a:off x="3190961" y="3125807"/>
+            <a:ext cx="264816" cy="338554"/>
+          </a:xfrm>
+          <a:prstGeom prst="rect">
+            <a:avLst/>
+          </a:prstGeom>
+          <a:noFill/>
+        </p:spPr>
+        <p:txBody>
+          <a:bodyPr wrap="none" rtlCol="0">
+            <a:spAutoFit/>
+          </a:bodyPr>
+          <a:lstStyle/>
+          <a:p>
+            <a:r>
+              <a:rPr lang="en-US" sz="1600" dirty="0">
+                <a:latin typeface="Helvetica" pitchFamily="2" charset="0"/>
+              </a:rPr>
+              <a:t>*</a:t>
+            </a:r>
+          </a:p>
+        </p:txBody>
+      </p:sp>
+      <p:sp>
+        <p:nvSpPr>
+          <p:cNvPr id="17" name="TextBox 16">
+            <a:extLst>
+              <a:ext uri="{FF2B5EF4-FFF2-40B4-BE49-F238E27FC236}">
+                <a16:creationId xmlns:a16="http://schemas.microsoft.com/office/drawing/2014/main" id="{C493DFD1-B300-5045-B8E3-1128AC63AE6E}"/>
+              </a:ext>
+            </a:extLst>
+          </p:cNvPr>
+          <p:cNvSpPr txBox="1"/>
+          <p:nvPr/>
+        </p:nvSpPr>
+        <p:spPr>
+          <a:xfrm>
+            <a:off x="3511527" y="3125807"/>
+            <a:ext cx="264816" cy="338554"/>
+          </a:xfrm>
+          <a:prstGeom prst="rect">
+            <a:avLst/>
+          </a:prstGeom>
+          <a:noFill/>
+        </p:spPr>
+        <p:txBody>
+          <a:bodyPr wrap="none" rtlCol="0">
+            <a:spAutoFit/>
+          </a:bodyPr>
+          <a:lstStyle/>
+          <a:p>
+            <a:r>
+              <a:rPr lang="en-US" sz="1600" dirty="0">
+                <a:latin typeface="Helvetica" pitchFamily="2" charset="0"/>
+              </a:rPr>
+              <a:t>*</a:t>
+            </a:r>
+          </a:p>
+        </p:txBody>
+      </p:sp>
+      <p:sp>
+        <p:nvSpPr>
+          <p:cNvPr id="18" name="TextBox 17">
+            <a:extLst>
+              <a:ext uri="{FF2B5EF4-FFF2-40B4-BE49-F238E27FC236}">
+                <a16:creationId xmlns:a16="http://schemas.microsoft.com/office/drawing/2014/main" id="{7E85F9A6-D968-2F49-A01F-77156EC7B01E}"/>
+              </a:ext>
+            </a:extLst>
+          </p:cNvPr>
+          <p:cNvSpPr txBox="1"/>
+          <p:nvPr/>
+        </p:nvSpPr>
+        <p:spPr>
+          <a:xfrm>
+            <a:off x="3427415" y="3125807"/>
+            <a:ext cx="264816" cy="338554"/>
+          </a:xfrm>
+          <a:prstGeom prst="rect">
+            <a:avLst/>
+          </a:prstGeom>
+          <a:noFill/>
+        </p:spPr>
+        <p:txBody>
+          <a:bodyPr wrap="none" rtlCol="0">
+            <a:spAutoFit/>
+          </a:bodyPr>
+          <a:lstStyle/>
+          <a:p>
+            <a:r>
+              <a:rPr lang="en-US" sz="1600" dirty="0">
+                <a:latin typeface="Helvetica" pitchFamily="2" charset="0"/>
+              </a:rPr>
+              <a:t>*</a:t>
+            </a:r>
+          </a:p>
+        </p:txBody>
+      </p:sp>
+      <p:sp>
+        <p:nvSpPr>
+          <p:cNvPr id="19" name="TextBox 18">
+            <a:extLst>
+              <a:ext uri="{FF2B5EF4-FFF2-40B4-BE49-F238E27FC236}">
+                <a16:creationId xmlns:a16="http://schemas.microsoft.com/office/drawing/2014/main" id="{BB944561-D856-6C46-9DE8-474BD8D82649}"/>
+              </a:ext>
+            </a:extLst>
+          </p:cNvPr>
+          <p:cNvSpPr txBox="1"/>
+          <p:nvPr/>
+        </p:nvSpPr>
+        <p:spPr>
+          <a:xfrm>
+            <a:off x="3752124" y="3125031"/>
+            <a:ext cx="264816" cy="338554"/>
+          </a:xfrm>
+          <a:prstGeom prst="rect">
+            <a:avLst/>
+          </a:prstGeom>
+          <a:noFill/>
+        </p:spPr>
+        <p:txBody>
+          <a:bodyPr wrap="none" rtlCol="0">
+            <a:spAutoFit/>
+          </a:bodyPr>
+          <a:lstStyle/>
+          <a:p>
+            <a:r>
+              <a:rPr lang="en-US" sz="1600" dirty="0">
+                <a:latin typeface="Helvetica" pitchFamily="2" charset="0"/>
+              </a:rPr>
+              <a:t>*</a:t>
+            </a:r>
+          </a:p>
+        </p:txBody>
+      </p:sp>
+      <p:sp>
+        <p:nvSpPr>
+          <p:cNvPr id="20" name="TextBox 19">
+            <a:extLst>
+              <a:ext uri="{FF2B5EF4-FFF2-40B4-BE49-F238E27FC236}">
+                <a16:creationId xmlns:a16="http://schemas.microsoft.com/office/drawing/2014/main" id="{A5B09D02-9E82-C14E-9866-B04E62A1F20C}"/>
+              </a:ext>
+            </a:extLst>
+          </p:cNvPr>
+          <p:cNvSpPr txBox="1"/>
+          <p:nvPr/>
+        </p:nvSpPr>
+        <p:spPr>
+          <a:xfrm>
+            <a:off x="3668012" y="3125031"/>
+            <a:ext cx="264816" cy="338554"/>
+          </a:xfrm>
+          <a:prstGeom prst="rect">
+            <a:avLst/>
+          </a:prstGeom>
+          <a:noFill/>
+        </p:spPr>
+        <p:txBody>
+          <a:bodyPr wrap="none" rtlCol="0">
+            <a:spAutoFit/>
+          </a:bodyPr>
+          <a:lstStyle/>
+          <a:p>
+            <a:r>
+              <a:rPr lang="en-US" sz="1600" dirty="0">
+                <a:latin typeface="Helvetica" pitchFamily="2" charset="0"/>
+              </a:rPr>
+              <a:t>*</a:t>
+            </a:r>
+          </a:p>
+        </p:txBody>
+      </p:sp>
+      <p:sp>
+        <p:nvSpPr>
+          <p:cNvPr id="21" name="TextBox 20">
+            <a:extLst>
+              <a:ext uri="{FF2B5EF4-FFF2-40B4-BE49-F238E27FC236}">
+                <a16:creationId xmlns:a16="http://schemas.microsoft.com/office/drawing/2014/main" id="{F38B454B-62A9-0C40-B402-21191B834E70}"/>
+              </a:ext>
+            </a:extLst>
+          </p:cNvPr>
+          <p:cNvSpPr txBox="1"/>
+          <p:nvPr/>
+        </p:nvSpPr>
+        <p:spPr>
+          <a:xfrm>
+            <a:off x="4076833" y="3124255"/>
+            <a:ext cx="264816" cy="338554"/>
+          </a:xfrm>
+          <a:prstGeom prst="rect">
+            <a:avLst/>
+          </a:prstGeom>
+          <a:noFill/>
+        </p:spPr>
+        <p:txBody>
+          <a:bodyPr wrap="none" rtlCol="0">
+            <a:spAutoFit/>
+          </a:bodyPr>
+          <a:lstStyle/>
+          <a:p>
+            <a:r>
+              <a:rPr lang="en-US" sz="1600" dirty="0">
+                <a:latin typeface="Helvetica" pitchFamily="2" charset="0"/>
+              </a:rPr>
+              <a:t>*</a:t>
+            </a:r>
+          </a:p>
+        </p:txBody>
+      </p:sp>
+      <p:sp>
+        <p:nvSpPr>
+          <p:cNvPr id="22" name="TextBox 21">
+            <a:extLst>
+              <a:ext uri="{FF2B5EF4-FFF2-40B4-BE49-F238E27FC236}">
+                <a16:creationId xmlns:a16="http://schemas.microsoft.com/office/drawing/2014/main" id="{2B5CE893-37D1-A641-A450-2BA85AF73861}"/>
+              </a:ext>
+            </a:extLst>
+          </p:cNvPr>
+          <p:cNvSpPr txBox="1"/>
+          <p:nvPr/>
+        </p:nvSpPr>
+        <p:spPr>
+          <a:xfrm>
+            <a:off x="3992721" y="3124255"/>
+            <a:ext cx="264816" cy="338554"/>
+          </a:xfrm>
+          <a:prstGeom prst="rect">
+            <a:avLst/>
+          </a:prstGeom>
+          <a:noFill/>
+        </p:spPr>
+        <p:txBody>
+          <a:bodyPr wrap="none" rtlCol="0">
+            <a:spAutoFit/>
+          </a:bodyPr>
+          <a:lstStyle/>
+          <a:p>
+            <a:r>
+              <a:rPr lang="en-US" sz="1600" dirty="0">
+                <a:latin typeface="Helvetica" pitchFamily="2" charset="0"/>
+              </a:rPr>
+              <a:t>*</a:t>
+            </a:r>
+          </a:p>
+        </p:txBody>
+      </p:sp>
+      <p:sp>
+        <p:nvSpPr>
+          <p:cNvPr id="23" name="TextBox 22">
+            <a:extLst>
+              <a:ext uri="{FF2B5EF4-FFF2-40B4-BE49-F238E27FC236}">
+                <a16:creationId xmlns:a16="http://schemas.microsoft.com/office/drawing/2014/main" id="{0D05D7A8-51DD-024A-9919-0A599347CA66}"/>
+              </a:ext>
+            </a:extLst>
+          </p:cNvPr>
+          <p:cNvSpPr txBox="1"/>
+          <p:nvPr/>
+        </p:nvSpPr>
+        <p:spPr>
+          <a:xfrm>
+            <a:off x="4313287" y="3124255"/>
+            <a:ext cx="264816" cy="338554"/>
+          </a:xfrm>
+          <a:prstGeom prst="rect">
+            <a:avLst/>
+          </a:prstGeom>
+          <a:noFill/>
+        </p:spPr>
+        <p:txBody>
+          <a:bodyPr wrap="none" rtlCol="0">
+            <a:spAutoFit/>
+          </a:bodyPr>
+          <a:lstStyle/>
+          <a:p>
+            <a:r>
+              <a:rPr lang="en-US" sz="1600" dirty="0">
+                <a:latin typeface="Helvetica" pitchFamily="2" charset="0"/>
+              </a:rPr>
+              <a:t>*</a:t>
+            </a:r>
+          </a:p>
+        </p:txBody>
+      </p:sp>
+      <p:sp>
+        <p:nvSpPr>
+          <p:cNvPr id="24" name="TextBox 23">
+            <a:extLst>
+              <a:ext uri="{FF2B5EF4-FFF2-40B4-BE49-F238E27FC236}">
+                <a16:creationId xmlns:a16="http://schemas.microsoft.com/office/drawing/2014/main" id="{3640F05B-B2D3-7840-9CD0-79CCE136C071}"/>
+              </a:ext>
+            </a:extLst>
+          </p:cNvPr>
+          <p:cNvSpPr txBox="1"/>
+          <p:nvPr/>
+        </p:nvSpPr>
+        <p:spPr>
+          <a:xfrm>
+            <a:off x="4229175" y="3124255"/>
+            <a:ext cx="264816" cy="338554"/>
+          </a:xfrm>
+          <a:prstGeom prst="rect">
+            <a:avLst/>
+          </a:prstGeom>
+          <a:noFill/>
+        </p:spPr>
+        <p:txBody>
+          <a:bodyPr wrap="none" rtlCol="0">
+            <a:spAutoFit/>
+          </a:bodyPr>
+          <a:lstStyle/>
+          <a:p>
+            <a:r>
+              <a:rPr lang="en-US" sz="1600" dirty="0">
+                <a:latin typeface="Helvetica" pitchFamily="2" charset="0"/>
+              </a:rPr>
+              <a:t>*</a:t>
+            </a:r>
+          </a:p>
+        </p:txBody>
+      </p:sp>
+      <p:sp>
+        <p:nvSpPr>
+          <p:cNvPr id="25" name="TextBox 24">
+            <a:extLst>
+              <a:ext uri="{FF2B5EF4-FFF2-40B4-BE49-F238E27FC236}">
+                <a16:creationId xmlns:a16="http://schemas.microsoft.com/office/drawing/2014/main" id="{0E3CF607-30A1-2C44-BA09-F1AAAA9973DE}"/>
+              </a:ext>
+            </a:extLst>
+          </p:cNvPr>
+          <p:cNvSpPr txBox="1"/>
+          <p:nvPr/>
+        </p:nvSpPr>
+        <p:spPr>
+          <a:xfrm>
+            <a:off x="4637933" y="3124255"/>
+            <a:ext cx="264816" cy="338554"/>
+          </a:xfrm>
+          <a:prstGeom prst="rect">
+            <a:avLst/>
+          </a:prstGeom>
+          <a:noFill/>
+        </p:spPr>
+        <p:txBody>
+          <a:bodyPr wrap="none" rtlCol="0">
+            <a:spAutoFit/>
+          </a:bodyPr>
+          <a:lstStyle/>
+          <a:p>
+            <a:r>
+              <a:rPr lang="en-US" sz="1600" dirty="0">
+                <a:latin typeface="Helvetica" pitchFamily="2" charset="0"/>
+              </a:rPr>
+              <a:t>*</a:t>
+            </a:r>
+          </a:p>
+        </p:txBody>
+      </p:sp>
+      <p:sp>
+        <p:nvSpPr>
+          <p:cNvPr id="26" name="TextBox 25">
+            <a:extLst>
+              <a:ext uri="{FF2B5EF4-FFF2-40B4-BE49-F238E27FC236}">
+                <a16:creationId xmlns:a16="http://schemas.microsoft.com/office/drawing/2014/main" id="{D28EB83A-F41D-D94D-969A-91169FAB6758}"/>
+              </a:ext>
+            </a:extLst>
+          </p:cNvPr>
+          <p:cNvSpPr txBox="1"/>
+          <p:nvPr/>
+        </p:nvSpPr>
+        <p:spPr>
+          <a:xfrm>
+            <a:off x="4553821" y="3124255"/>
+            <a:ext cx="264816" cy="338554"/>
+          </a:xfrm>
+          <a:prstGeom prst="rect">
+            <a:avLst/>
+          </a:prstGeom>
+          <a:noFill/>
+        </p:spPr>
+        <p:txBody>
+          <a:bodyPr wrap="none" rtlCol="0">
+            <a:spAutoFit/>
+          </a:bodyPr>
+          <a:lstStyle/>
+          <a:p>
+            <a:r>
+              <a:rPr lang="en-US" sz="1600" dirty="0">
+                <a:latin typeface="Helvetica" pitchFamily="2" charset="0"/>
+              </a:rPr>
+              <a:t>*</a:t>
+            </a:r>
+          </a:p>
+        </p:txBody>
+      </p:sp>
+      <p:pic>
+        <p:nvPicPr>
+          <p:cNvPr id="27" name="Picture 26">
+            <a:extLst>
+              <a:ext uri="{FF2B5EF4-FFF2-40B4-BE49-F238E27FC236}">
+                <a16:creationId xmlns:a16="http://schemas.microsoft.com/office/drawing/2014/main" id="{2D5BDE7F-535C-7B4A-B206-E185F048496E}"/>
+              </a:ext>
+            </a:extLst>
+          </p:cNvPr>
+          <p:cNvPicPr>
+            <a:picLocks noChangeAspect="1"/>
+          </p:cNvPicPr>
+          <p:nvPr/>
+        </p:nvPicPr>
+        <p:blipFill rotWithShape="1">
+          <a:blip r:embed="rId3"/>
+          <a:srcRect l="12752" t="1" r="85935" b="22693"/>
+          <a:stretch/>
+        </p:blipFill>
+        <p:spPr>
+          <a:xfrm>
+            <a:off x="5994622" y="955393"/>
+            <a:ext cx="884256" cy="2237152"/>
+          </a:xfrm>
+          <a:prstGeom prst="rect">
+            <a:avLst/>
+          </a:prstGeom>
+        </p:spPr>
+      </p:pic>
+      <p:sp>
+        <p:nvSpPr>
+          <p:cNvPr id="28" name="TextBox 27">
+            <a:extLst>
+              <a:ext uri="{FF2B5EF4-FFF2-40B4-BE49-F238E27FC236}">
+                <a16:creationId xmlns:a16="http://schemas.microsoft.com/office/drawing/2014/main" id="{B69F1909-0CD4-0A4A-9B5C-99A3502CD8E4}"/>
+              </a:ext>
+            </a:extLst>
+          </p:cNvPr>
+          <p:cNvSpPr txBox="1"/>
+          <p:nvPr/>
+        </p:nvSpPr>
+        <p:spPr>
+          <a:xfrm>
+            <a:off x="6044057" y="585674"/>
+            <a:ext cx="702436" cy="307777"/>
+          </a:xfrm>
+          <a:prstGeom prst="rect">
+            <a:avLst/>
+          </a:prstGeom>
+          <a:noFill/>
+        </p:spPr>
+        <p:txBody>
+          <a:bodyPr wrap="none" rtlCol="0">
+            <a:spAutoFit/>
+          </a:bodyPr>
+          <a:lstStyle/>
+          <a:p>
+            <a:r>
+              <a:rPr lang="en-US" sz="1400" dirty="0">
+                <a:latin typeface="Helvetica" pitchFamily="2" charset="0"/>
+              </a:rPr>
+              <a:t>helix 2</a:t>
+            </a:r>
+          </a:p>
+        </p:txBody>
+      </p:sp>
+      <p:sp>
+        <p:nvSpPr>
+          <p:cNvPr id="31" name="TextBox 30">
+            <a:extLst>
+              <a:ext uri="{FF2B5EF4-FFF2-40B4-BE49-F238E27FC236}">
+                <a16:creationId xmlns:a16="http://schemas.microsoft.com/office/drawing/2014/main" id="{329C0400-F7D6-0346-88D1-EFDB8479716C}"/>
+              </a:ext>
+            </a:extLst>
+          </p:cNvPr>
+          <p:cNvSpPr txBox="1"/>
+          <p:nvPr/>
+        </p:nvSpPr>
+        <p:spPr>
+          <a:xfrm>
+            <a:off x="6245223" y="3124255"/>
+            <a:ext cx="264816" cy="338554"/>
+          </a:xfrm>
+          <a:prstGeom prst="rect">
+            <a:avLst/>
+          </a:prstGeom>
+          <a:noFill/>
+        </p:spPr>
+        <p:txBody>
+          <a:bodyPr wrap="none" rtlCol="0">
+            <a:spAutoFit/>
+          </a:bodyPr>
+          <a:lstStyle/>
+          <a:p>
+            <a:r>
+              <a:rPr lang="en-US" sz="1600" dirty="0">
+                <a:latin typeface="Helvetica" pitchFamily="2" charset="0"/>
+              </a:rPr>
+              <a:t>*</a:t>
+            </a:r>
+          </a:p>
+        </p:txBody>
+      </p:sp>
+      <p:sp>
+        <p:nvSpPr>
+          <p:cNvPr id="32" name="TextBox 31">
+            <a:extLst>
+              <a:ext uri="{FF2B5EF4-FFF2-40B4-BE49-F238E27FC236}">
+                <a16:creationId xmlns:a16="http://schemas.microsoft.com/office/drawing/2014/main" id="{3E01ABD8-1A04-BD4E-9994-630D861563E3}"/>
+              </a:ext>
+            </a:extLst>
+          </p:cNvPr>
+          <p:cNvSpPr txBox="1"/>
+          <p:nvPr/>
+        </p:nvSpPr>
+        <p:spPr>
+          <a:xfrm>
+            <a:off x="6565789" y="3124255"/>
+            <a:ext cx="264816" cy="338554"/>
+          </a:xfrm>
+          <a:prstGeom prst="rect">
+            <a:avLst/>
+          </a:prstGeom>
+          <a:noFill/>
+        </p:spPr>
+        <p:txBody>
+          <a:bodyPr wrap="none" rtlCol="0">
+            <a:spAutoFit/>
+          </a:bodyPr>
+          <a:lstStyle/>
+          <a:p>
+            <a:r>
+              <a:rPr lang="en-US" sz="1600" dirty="0">
+                <a:latin typeface="Helvetica" pitchFamily="2" charset="0"/>
+              </a:rPr>
+              <a:t>*</a:t>
+            </a:r>
+          </a:p>
+        </p:txBody>
+      </p:sp>
+      <p:sp>
+        <p:nvSpPr>
+          <p:cNvPr id="33" name="TextBox 32">
+            <a:extLst>
+              <a:ext uri="{FF2B5EF4-FFF2-40B4-BE49-F238E27FC236}">
+                <a16:creationId xmlns:a16="http://schemas.microsoft.com/office/drawing/2014/main" id="{CE41EF2E-33DB-464C-8377-0915139D613B}"/>
+              </a:ext>
+            </a:extLst>
+          </p:cNvPr>
+          <p:cNvSpPr txBox="1"/>
+          <p:nvPr/>
+        </p:nvSpPr>
+        <p:spPr>
+          <a:xfrm>
+            <a:off x="6481677" y="3124255"/>
+            <a:ext cx="264816" cy="338554"/>
+          </a:xfrm>
+          <a:prstGeom prst="rect">
+            <a:avLst/>
+          </a:prstGeom>
+          <a:noFill/>
+        </p:spPr>
+        <p:txBody>
+          <a:bodyPr wrap="none" rtlCol="0">
+            <a:spAutoFit/>
+          </a:bodyPr>
+          <a:lstStyle/>
+          <a:p>
+            <a:r>
+              <a:rPr lang="en-US" sz="1600" dirty="0">
+                <a:latin typeface="Helvetica" pitchFamily="2" charset="0"/>
+              </a:rPr>
+              <a:t>*</a:t>
+            </a:r>
+          </a:p>
+        </p:txBody>
+      </p:sp>
+      <p:sp>
+        <p:nvSpPr>
+          <p:cNvPr id="34" name="TextBox 33">
+            <a:extLst>
+              <a:ext uri="{FF2B5EF4-FFF2-40B4-BE49-F238E27FC236}">
+                <a16:creationId xmlns:a16="http://schemas.microsoft.com/office/drawing/2014/main" id="{E10FB0FD-F18C-5F4F-870B-B8A924A6C4FE}"/>
+              </a:ext>
+            </a:extLst>
+          </p:cNvPr>
+          <p:cNvSpPr txBox="1"/>
+          <p:nvPr/>
+        </p:nvSpPr>
+        <p:spPr>
+          <a:xfrm>
+            <a:off x="7972954" y="585674"/>
+            <a:ext cx="832279" cy="307777"/>
+          </a:xfrm>
+          <a:prstGeom prst="rect">
+            <a:avLst/>
+          </a:prstGeom>
+          <a:noFill/>
+        </p:spPr>
+        <p:txBody>
+          <a:bodyPr wrap="none" rtlCol="0">
+            <a:spAutoFit/>
+          </a:bodyPr>
+          <a:lstStyle/>
+          <a:p>
+            <a:r>
+              <a:rPr lang="en-US" sz="1400" dirty="0">
+                <a:latin typeface="Helvetica" pitchFamily="2" charset="0"/>
+              </a:rPr>
+              <a:t>helix 12</a:t>
+            </a:r>
+          </a:p>
+        </p:txBody>
+      </p:sp>
+      <p:pic>
+        <p:nvPicPr>
+          <p:cNvPr id="35" name="Picture 34">
+            <a:extLst>
+              <a:ext uri="{FF2B5EF4-FFF2-40B4-BE49-F238E27FC236}">
+                <a16:creationId xmlns:a16="http://schemas.microsoft.com/office/drawing/2014/main" id="{6FC8BB64-8D12-0A4A-96D7-071AD769FCCA}"/>
+              </a:ext>
+            </a:extLst>
+          </p:cNvPr>
+          <p:cNvPicPr>
+            <a:picLocks noChangeAspect="1"/>
+          </p:cNvPicPr>
+          <p:nvPr/>
+        </p:nvPicPr>
+        <p:blipFill rotWithShape="1">
+          <a:blip r:embed="rId3"/>
+          <a:srcRect l="42595" t="13" r="56080" b="22681"/>
+          <a:stretch/>
+        </p:blipFill>
+        <p:spPr>
+          <a:xfrm>
+            <a:off x="7952072" y="955393"/>
+            <a:ext cx="889987" cy="2237152"/>
+          </a:xfrm>
+          <a:prstGeom prst="rect">
+            <a:avLst/>
+          </a:prstGeom>
+        </p:spPr>
+      </p:pic>
+      <p:sp>
+        <p:nvSpPr>
+          <p:cNvPr id="36" name="TextBox 35">
+            <a:extLst>
+              <a:ext uri="{FF2B5EF4-FFF2-40B4-BE49-F238E27FC236}">
+                <a16:creationId xmlns:a16="http://schemas.microsoft.com/office/drawing/2014/main" id="{99B8C41C-808B-2C41-AF37-336B3F0AE5B9}"/>
+              </a:ext>
+            </a:extLst>
+          </p:cNvPr>
+          <p:cNvSpPr txBox="1"/>
+          <p:nvPr/>
+        </p:nvSpPr>
+        <p:spPr>
+          <a:xfrm>
+            <a:off x="8264657" y="3124255"/>
+            <a:ext cx="264816" cy="338554"/>
+          </a:xfrm>
+          <a:prstGeom prst="rect">
+            <a:avLst/>
+          </a:prstGeom>
+          <a:noFill/>
+        </p:spPr>
+        <p:txBody>
+          <a:bodyPr wrap="none" rtlCol="0">
+            <a:spAutoFit/>
+          </a:bodyPr>
+          <a:lstStyle/>
+          <a:p>
+            <a:r>
+              <a:rPr lang="en-US" sz="1600" dirty="0">
+                <a:latin typeface="Helvetica" pitchFamily="2" charset="0"/>
+              </a:rPr>
+              <a:t>*</a:t>
+            </a:r>
+          </a:p>
+        </p:txBody>
+      </p:sp>
+      <p:sp>
+        <p:nvSpPr>
+          <p:cNvPr id="37" name="TextBox 36">
+            <a:extLst>
+              <a:ext uri="{FF2B5EF4-FFF2-40B4-BE49-F238E27FC236}">
+                <a16:creationId xmlns:a16="http://schemas.microsoft.com/office/drawing/2014/main" id="{BB32859B-C012-6D40-BC80-5E0BC73A8ECC}"/>
+              </a:ext>
+            </a:extLst>
+          </p:cNvPr>
+          <p:cNvSpPr txBox="1"/>
+          <p:nvPr/>
+        </p:nvSpPr>
+        <p:spPr>
+          <a:xfrm>
+            <a:off x="7039207" y="493341"/>
+            <a:ext cx="702436" cy="523220"/>
+          </a:xfrm>
+          <a:prstGeom prst="rect">
+            <a:avLst/>
+          </a:prstGeom>
+          <a:noFill/>
+        </p:spPr>
+        <p:txBody>
+          <a:bodyPr wrap="none" rtlCol="0">
+            <a:spAutoFit/>
+          </a:bodyPr>
+          <a:lstStyle/>
+          <a:p>
+            <a:pPr algn="ctr"/>
+            <a:r>
+              <a:rPr lang="en-US" sz="1400" dirty="0">
+                <a:latin typeface="Helvetica" pitchFamily="2" charset="0"/>
+              </a:rPr>
+              <a:t>N90</a:t>
+            </a:r>
+          </a:p>
+          <a:p>
+            <a:pPr algn="ctr"/>
+            <a:r>
+              <a:rPr lang="en-US" sz="1400" dirty="0">
+                <a:latin typeface="Helvetica" pitchFamily="2" charset="0"/>
+              </a:rPr>
+              <a:t>glycan</a:t>
+            </a:r>
+          </a:p>
+        </p:txBody>
+      </p:sp>
+      <p:pic>
+        <p:nvPicPr>
+          <p:cNvPr id="38" name="Picture 37">
+            <a:extLst>
+              <a:ext uri="{FF2B5EF4-FFF2-40B4-BE49-F238E27FC236}">
+                <a16:creationId xmlns:a16="http://schemas.microsoft.com/office/drawing/2014/main" id="{FAE82112-BC37-A14E-ACEF-21C2A2FEE2B6}"/>
+              </a:ext>
+            </a:extLst>
+          </p:cNvPr>
+          <p:cNvPicPr>
+            <a:picLocks noChangeAspect="1"/>
+          </p:cNvPicPr>
+          <p:nvPr/>
+        </p:nvPicPr>
+        <p:blipFill rotWithShape="1">
+          <a:blip r:embed="rId3"/>
+          <a:srcRect l="14304" t="1" r="84850" b="22693"/>
+          <a:stretch/>
+        </p:blipFill>
+        <p:spPr>
+          <a:xfrm>
+            <a:off x="7115332" y="955393"/>
+            <a:ext cx="569165" cy="2237152"/>
+          </a:xfrm>
+          <a:prstGeom prst="rect">
+            <a:avLst/>
+          </a:prstGeom>
+        </p:spPr>
+      </p:pic>
+      <p:sp>
+        <p:nvSpPr>
+          <p:cNvPr id="39" name="TextBox 38">
+            <a:extLst>
+              <a:ext uri="{FF2B5EF4-FFF2-40B4-BE49-F238E27FC236}">
+                <a16:creationId xmlns:a16="http://schemas.microsoft.com/office/drawing/2014/main" id="{44B22A75-E5C8-A04F-8AE2-CF1A110B5E3A}"/>
+              </a:ext>
+            </a:extLst>
+          </p:cNvPr>
+          <p:cNvSpPr txBox="1"/>
+          <p:nvPr/>
+        </p:nvSpPr>
+        <p:spPr>
+          <a:xfrm>
+            <a:off x="7195448" y="3124255"/>
+            <a:ext cx="264816" cy="338554"/>
+          </a:xfrm>
+          <a:prstGeom prst="rect">
+            <a:avLst/>
+          </a:prstGeom>
+          <a:noFill/>
+        </p:spPr>
+        <p:txBody>
+          <a:bodyPr wrap="none" rtlCol="0">
+            <a:spAutoFit/>
+          </a:bodyPr>
+          <a:lstStyle/>
+          <a:p>
+            <a:r>
+              <a:rPr lang="en-US" sz="1600" dirty="0">
+                <a:latin typeface="Helvetica" pitchFamily="2" charset="0"/>
+              </a:rPr>
+              <a:t>*</a:t>
+            </a:r>
+          </a:p>
+        </p:txBody>
+      </p:sp>
+      <p:sp>
+        <p:nvSpPr>
+          <p:cNvPr id="40" name="TextBox 39">
+            <a:extLst>
+              <a:ext uri="{FF2B5EF4-FFF2-40B4-BE49-F238E27FC236}">
+                <a16:creationId xmlns:a16="http://schemas.microsoft.com/office/drawing/2014/main" id="{E12BB7EE-4A1D-7C4E-92F5-98D307A43168}"/>
+              </a:ext>
+            </a:extLst>
+          </p:cNvPr>
+          <p:cNvSpPr txBox="1"/>
+          <p:nvPr/>
+        </p:nvSpPr>
+        <p:spPr>
+          <a:xfrm>
+            <a:off x="9154644" y="493341"/>
+            <a:ext cx="721672" cy="523220"/>
+          </a:xfrm>
+          <a:prstGeom prst="rect">
+            <a:avLst/>
+          </a:prstGeom>
+          <a:noFill/>
+        </p:spPr>
+        <p:txBody>
+          <a:bodyPr wrap="none" rtlCol="0">
+            <a:spAutoFit/>
+          </a:bodyPr>
+          <a:lstStyle/>
+          <a:p>
+            <a:pPr algn="ctr"/>
+            <a:r>
+              <a:rPr lang="en-US" sz="1400" dirty="0">
+                <a:latin typeface="Helvetica" pitchFamily="2" charset="0"/>
+              </a:rPr>
+              <a:t>K353</a:t>
+            </a:r>
+          </a:p>
+          <a:p>
+            <a:pPr algn="ctr"/>
+            <a:r>
+              <a:rPr lang="en-US" sz="1400" dirty="0">
+                <a:latin typeface="Helvetica" pitchFamily="2" charset="0"/>
+              </a:rPr>
+              <a:t>hairpin</a:t>
+            </a:r>
+          </a:p>
+        </p:txBody>
+      </p:sp>
+      <p:pic>
+        <p:nvPicPr>
+          <p:cNvPr id="41" name="Picture 40">
+            <a:extLst>
+              <a:ext uri="{FF2B5EF4-FFF2-40B4-BE49-F238E27FC236}">
+                <a16:creationId xmlns:a16="http://schemas.microsoft.com/office/drawing/2014/main" id="{A33AC8B2-E8AA-2040-B3BF-8D39D8814D39}"/>
+              </a:ext>
+            </a:extLst>
+          </p:cNvPr>
+          <p:cNvPicPr>
+            <a:picLocks noChangeAspect="1"/>
+          </p:cNvPicPr>
+          <p:nvPr/>
+        </p:nvPicPr>
+        <p:blipFill rotWithShape="1">
+          <a:blip r:embed="rId3"/>
+          <a:srcRect l="45586" t="13" r="53230" b="22681"/>
+          <a:stretch/>
+        </p:blipFill>
+        <p:spPr>
+          <a:xfrm>
+            <a:off x="9154644" y="955393"/>
+            <a:ext cx="795650" cy="2237152"/>
+          </a:xfrm>
+          <a:prstGeom prst="rect">
+            <a:avLst/>
+          </a:prstGeom>
+        </p:spPr>
+      </p:pic>
+      <p:sp>
+        <p:nvSpPr>
+          <p:cNvPr id="42" name="TextBox 41">
+            <a:extLst>
+              <a:ext uri="{FF2B5EF4-FFF2-40B4-BE49-F238E27FC236}">
+                <a16:creationId xmlns:a16="http://schemas.microsoft.com/office/drawing/2014/main" id="{8BC107B7-73BC-F94E-B792-F4C2E65AE097}"/>
+              </a:ext>
+            </a:extLst>
+          </p:cNvPr>
+          <p:cNvSpPr txBox="1"/>
+          <p:nvPr/>
+        </p:nvSpPr>
+        <p:spPr>
+          <a:xfrm>
+            <a:off x="9308566" y="3124255"/>
+            <a:ext cx="264816" cy="338554"/>
+          </a:xfrm>
+          <a:prstGeom prst="rect">
+            <a:avLst/>
+          </a:prstGeom>
+          <a:noFill/>
+        </p:spPr>
+        <p:txBody>
+          <a:bodyPr wrap="none" rtlCol="0">
+            <a:spAutoFit/>
+          </a:bodyPr>
+          <a:lstStyle/>
+          <a:p>
+            <a:r>
+              <a:rPr lang="en-US" sz="1600" dirty="0">
+                <a:latin typeface="Helvetica" pitchFamily="2" charset="0"/>
+              </a:rPr>
+              <a:t>*</a:t>
+            </a:r>
+          </a:p>
+        </p:txBody>
+      </p:sp>
+      <p:sp>
+        <p:nvSpPr>
+          <p:cNvPr id="43" name="TextBox 42">
+            <a:extLst>
+              <a:ext uri="{FF2B5EF4-FFF2-40B4-BE49-F238E27FC236}">
+                <a16:creationId xmlns:a16="http://schemas.microsoft.com/office/drawing/2014/main" id="{8EC44E5F-B18E-F84E-B199-49E58F8F1B14}"/>
+              </a:ext>
+            </a:extLst>
+          </p:cNvPr>
+          <p:cNvSpPr txBox="1"/>
+          <p:nvPr/>
+        </p:nvSpPr>
+        <p:spPr>
+          <a:xfrm>
+            <a:off x="9392564" y="3125317"/>
+            <a:ext cx="264816" cy="338554"/>
+          </a:xfrm>
+          <a:prstGeom prst="rect">
+            <a:avLst/>
+          </a:prstGeom>
+          <a:noFill/>
+        </p:spPr>
+        <p:txBody>
+          <a:bodyPr wrap="none" rtlCol="0">
+            <a:spAutoFit/>
+          </a:bodyPr>
+          <a:lstStyle/>
+          <a:p>
+            <a:r>
+              <a:rPr lang="en-US" sz="1600" dirty="0">
+                <a:latin typeface="Helvetica" pitchFamily="2" charset="0"/>
+              </a:rPr>
+              <a:t>*</a:t>
+            </a:r>
+          </a:p>
+        </p:txBody>
+      </p:sp>
+      <p:sp>
+        <p:nvSpPr>
+          <p:cNvPr id="44" name="TextBox 43">
+            <a:extLst>
+              <a:ext uri="{FF2B5EF4-FFF2-40B4-BE49-F238E27FC236}">
+                <a16:creationId xmlns:a16="http://schemas.microsoft.com/office/drawing/2014/main" id="{578EF7EE-00B6-B645-90DA-26F8B4918515}"/>
+              </a:ext>
+            </a:extLst>
+          </p:cNvPr>
+          <p:cNvSpPr txBox="1"/>
+          <p:nvPr/>
+        </p:nvSpPr>
+        <p:spPr>
+          <a:xfrm>
+            <a:off x="9476562" y="3124255"/>
+            <a:ext cx="264816" cy="338554"/>
+          </a:xfrm>
+          <a:prstGeom prst="rect">
+            <a:avLst/>
+          </a:prstGeom>
+          <a:noFill/>
+        </p:spPr>
+        <p:txBody>
+          <a:bodyPr wrap="none" rtlCol="0">
+            <a:spAutoFit/>
+          </a:bodyPr>
+          <a:lstStyle/>
+          <a:p>
+            <a:r>
+              <a:rPr lang="en-US" sz="1600" dirty="0">
+                <a:latin typeface="Helvetica" pitchFamily="2" charset="0"/>
+              </a:rPr>
+              <a:t>*</a:t>
+            </a:r>
+          </a:p>
+        </p:txBody>
+      </p:sp>
+      <p:sp>
+        <p:nvSpPr>
+          <p:cNvPr id="45" name="TextBox 44">
+            <a:extLst>
+              <a:ext uri="{FF2B5EF4-FFF2-40B4-BE49-F238E27FC236}">
+                <a16:creationId xmlns:a16="http://schemas.microsoft.com/office/drawing/2014/main" id="{4D26FA33-C58C-CF45-B39D-00B11CB4DE26}"/>
+              </a:ext>
+            </a:extLst>
+          </p:cNvPr>
+          <p:cNvSpPr txBox="1"/>
+          <p:nvPr/>
+        </p:nvSpPr>
+        <p:spPr>
+          <a:xfrm>
+            <a:off x="9629037" y="3124255"/>
+            <a:ext cx="264816" cy="338554"/>
+          </a:xfrm>
+          <a:prstGeom prst="rect">
+            <a:avLst/>
+          </a:prstGeom>
+          <a:noFill/>
+        </p:spPr>
+        <p:txBody>
+          <a:bodyPr wrap="none" rtlCol="0">
+            <a:spAutoFit/>
+          </a:bodyPr>
+          <a:lstStyle/>
+          <a:p>
+            <a:r>
+              <a:rPr lang="en-US" sz="1600" dirty="0">
+                <a:latin typeface="Helvetica" pitchFamily="2" charset="0"/>
+              </a:rPr>
+              <a:t>*</a:t>
+            </a:r>
+          </a:p>
+        </p:txBody>
+      </p:sp>
+      <p:pic>
+        <p:nvPicPr>
+          <p:cNvPr id="46" name="Picture 45">
+            <a:extLst>
+              <a:ext uri="{FF2B5EF4-FFF2-40B4-BE49-F238E27FC236}">
+                <a16:creationId xmlns:a16="http://schemas.microsoft.com/office/drawing/2014/main" id="{E37AE048-BBFA-B345-8BE8-1EE0F317BFC9}"/>
+              </a:ext>
+            </a:extLst>
+          </p:cNvPr>
+          <p:cNvPicPr>
+            <a:picLocks noChangeAspect="1"/>
+          </p:cNvPicPr>
+          <p:nvPr/>
+        </p:nvPicPr>
+        <p:blipFill rotWithShape="1">
+          <a:blip r:embed="rId3"/>
+          <a:srcRect l="50358" t="13" r="48921" b="22681"/>
+          <a:stretch/>
+        </p:blipFill>
+        <p:spPr>
+          <a:xfrm>
+            <a:off x="10219356" y="955393"/>
+            <a:ext cx="484682" cy="2237152"/>
+          </a:xfrm>
+          <a:prstGeom prst="rect">
+            <a:avLst/>
+          </a:prstGeom>
+        </p:spPr>
+      </p:pic>
+      <p:sp>
+        <p:nvSpPr>
+          <p:cNvPr id="47" name="TextBox 46">
+            <a:extLst>
+              <a:ext uri="{FF2B5EF4-FFF2-40B4-BE49-F238E27FC236}">
+                <a16:creationId xmlns:a16="http://schemas.microsoft.com/office/drawing/2014/main" id="{83A6E874-0372-104A-BEF8-2B71E274647E}"/>
+              </a:ext>
+            </a:extLst>
+          </p:cNvPr>
+          <p:cNvSpPr txBox="1"/>
+          <p:nvPr/>
+        </p:nvSpPr>
+        <p:spPr>
+          <a:xfrm>
+            <a:off x="10125645" y="616451"/>
+            <a:ext cx="612668" cy="307777"/>
+          </a:xfrm>
+          <a:prstGeom prst="rect">
+            <a:avLst/>
+          </a:prstGeom>
+          <a:noFill/>
+        </p:spPr>
+        <p:txBody>
+          <a:bodyPr wrap="none" rtlCol="0">
+            <a:spAutoFit/>
+          </a:bodyPr>
+          <a:lstStyle/>
+          <a:p>
+            <a:pPr algn="ctr"/>
+            <a:r>
+              <a:rPr lang="en-US" sz="1400" dirty="0">
+                <a:latin typeface="Helvetica" pitchFamily="2" charset="0"/>
+              </a:rPr>
+              <a:t>R393</a:t>
+            </a:r>
+          </a:p>
+        </p:txBody>
+      </p:sp>
+      <p:sp>
+        <p:nvSpPr>
+          <p:cNvPr id="48" name="TextBox 47">
+            <a:extLst>
+              <a:ext uri="{FF2B5EF4-FFF2-40B4-BE49-F238E27FC236}">
+                <a16:creationId xmlns:a16="http://schemas.microsoft.com/office/drawing/2014/main" id="{6E88F2FB-DFD3-0040-9419-D0971966A40F}"/>
+              </a:ext>
+            </a:extLst>
+          </p:cNvPr>
+          <p:cNvSpPr txBox="1"/>
+          <p:nvPr/>
+        </p:nvSpPr>
+        <p:spPr>
+          <a:xfrm>
+            <a:off x="10352475" y="3124255"/>
+            <a:ext cx="264816" cy="338554"/>
+          </a:xfrm>
+          <a:prstGeom prst="rect">
+            <a:avLst/>
+          </a:prstGeom>
+          <a:noFill/>
+        </p:spPr>
+        <p:txBody>
+          <a:bodyPr wrap="none" rtlCol="0">
+            <a:spAutoFit/>
+          </a:bodyPr>
+          <a:lstStyle/>
+          <a:p>
+            <a:r>
+              <a:rPr lang="en-US" sz="1600" dirty="0">
+                <a:latin typeface="Helvetica" pitchFamily="2" charset="0"/>
+              </a:rPr>
+              <a:t>*</a:t>
+            </a:r>
+          </a:p>
+        </p:txBody>
+      </p:sp>
+    </p:spTree>
+    <p:extLst>
+      <p:ext uri="{BB962C8B-B14F-4D97-AF65-F5344CB8AC3E}">
+        <p14:creationId xmlns:p14="http://schemas.microsoft.com/office/powerpoint/2010/main" val="28506680"/>
       </p:ext>
     </p:extLst>
   </p:cSld>

</xml_diff>